<commit_message>
folder for interview question bank, and some coding updates
</commit_message>
<xml_diff>
--- a/OOPs/C_Sharp OOPs PPT.pptx
+++ b/OOPs/C_Sharp OOPs PPT.pptx
@@ -294,7 +294,7 @@
           <a:p>
             <a:fld id="{0528EF27-8C27-40F1-A944-C27BB9C767B6}" type="datetimeFigureOut">
               <a:rPr lang="en-IN" smtClean="0"/>
-              <a:t>19-01-2024</a:t>
+              <a:t>29-01-2024</a:t>
             </a:fld>
             <a:endParaRPr lang="en-IN"/>
           </a:p>
@@ -879,7 +879,7 @@
           <a:p>
             <a:fld id="{B289758E-6208-489D-8AAB-D4C4A67BF4EA}" type="datetimeFigureOut">
               <a:rPr lang="en-IN" smtClean="0"/>
-              <a:t>19-01-2024</a:t>
+              <a:t>29-01-2024</a:t>
             </a:fld>
             <a:endParaRPr lang="en-IN"/>
           </a:p>
@@ -1079,7 +1079,7 @@
           <a:p>
             <a:fld id="{B289758E-6208-489D-8AAB-D4C4A67BF4EA}" type="datetimeFigureOut">
               <a:rPr lang="en-IN" smtClean="0"/>
-              <a:t>19-01-2024</a:t>
+              <a:t>29-01-2024</a:t>
             </a:fld>
             <a:endParaRPr lang="en-IN"/>
           </a:p>
@@ -1289,7 +1289,7 @@
           <a:p>
             <a:fld id="{B289758E-6208-489D-8AAB-D4C4A67BF4EA}" type="datetimeFigureOut">
               <a:rPr lang="en-IN" smtClean="0"/>
-              <a:t>19-01-2024</a:t>
+              <a:t>29-01-2024</a:t>
             </a:fld>
             <a:endParaRPr lang="en-IN"/>
           </a:p>
@@ -1489,7 +1489,7 @@
           <a:p>
             <a:fld id="{B289758E-6208-489D-8AAB-D4C4A67BF4EA}" type="datetimeFigureOut">
               <a:rPr lang="en-IN" smtClean="0"/>
-              <a:t>19-01-2024</a:t>
+              <a:t>29-01-2024</a:t>
             </a:fld>
             <a:endParaRPr lang="en-IN"/>
           </a:p>
@@ -1765,7 +1765,7 @@
           <a:p>
             <a:fld id="{B289758E-6208-489D-8AAB-D4C4A67BF4EA}" type="datetimeFigureOut">
               <a:rPr lang="en-IN" smtClean="0"/>
-              <a:t>19-01-2024</a:t>
+              <a:t>29-01-2024</a:t>
             </a:fld>
             <a:endParaRPr lang="en-IN"/>
           </a:p>
@@ -2033,7 +2033,7 @@
           <a:p>
             <a:fld id="{B289758E-6208-489D-8AAB-D4C4A67BF4EA}" type="datetimeFigureOut">
               <a:rPr lang="en-IN" smtClean="0"/>
-              <a:t>19-01-2024</a:t>
+              <a:t>29-01-2024</a:t>
             </a:fld>
             <a:endParaRPr lang="en-IN"/>
           </a:p>
@@ -2448,7 +2448,7 @@
           <a:p>
             <a:fld id="{B289758E-6208-489D-8AAB-D4C4A67BF4EA}" type="datetimeFigureOut">
               <a:rPr lang="en-IN" smtClean="0"/>
-              <a:t>19-01-2024</a:t>
+              <a:t>29-01-2024</a:t>
             </a:fld>
             <a:endParaRPr lang="en-IN"/>
           </a:p>
@@ -2590,7 +2590,7 @@
           <a:p>
             <a:fld id="{B289758E-6208-489D-8AAB-D4C4A67BF4EA}" type="datetimeFigureOut">
               <a:rPr lang="en-IN" smtClean="0"/>
-              <a:t>19-01-2024</a:t>
+              <a:t>29-01-2024</a:t>
             </a:fld>
             <a:endParaRPr lang="en-IN"/>
           </a:p>
@@ -2703,7 +2703,7 @@
           <a:p>
             <a:fld id="{B289758E-6208-489D-8AAB-D4C4A67BF4EA}" type="datetimeFigureOut">
               <a:rPr lang="en-IN" smtClean="0"/>
-              <a:t>19-01-2024</a:t>
+              <a:t>29-01-2024</a:t>
             </a:fld>
             <a:endParaRPr lang="en-IN"/>
           </a:p>
@@ -3016,7 +3016,7 @@
           <a:p>
             <a:fld id="{B289758E-6208-489D-8AAB-D4C4A67BF4EA}" type="datetimeFigureOut">
               <a:rPr lang="en-IN" smtClean="0"/>
-              <a:t>19-01-2024</a:t>
+              <a:t>29-01-2024</a:t>
             </a:fld>
             <a:endParaRPr lang="en-IN"/>
           </a:p>
@@ -3305,7 +3305,7 @@
           <a:p>
             <a:fld id="{B289758E-6208-489D-8AAB-D4C4A67BF4EA}" type="datetimeFigureOut">
               <a:rPr lang="en-IN" smtClean="0"/>
-              <a:t>19-01-2024</a:t>
+              <a:t>29-01-2024</a:t>
             </a:fld>
             <a:endParaRPr lang="en-IN"/>
           </a:p>
@@ -3548,7 +3548,7 @@
           <a:p>
             <a:fld id="{B289758E-6208-489D-8AAB-D4C4A67BF4EA}" type="datetimeFigureOut">
               <a:rPr lang="en-IN" smtClean="0"/>
-              <a:t>19-01-2024</a:t>
+              <a:t>29-01-2024</a:t>
             </a:fld>
             <a:endParaRPr lang="en-IN"/>
           </a:p>

</xml_diff>